<commit_message>
Solución ejercicio en clase
</commit_message>
<xml_diff>
--- a/Clase1/Clase 1.pptx
+++ b/Clase1/Clase 1.pptx
@@ -9301,7 +9301,7 @@
             </a:pPr>
             <a:r>
               <a:rPr lang="es" dirty="0" smtClean="0"/>
-              <a:t>Estructura UI</a:t>
+              <a:t>Estructura de una App</a:t>
             </a:r>
             <a:endParaRPr dirty="0"/>
           </a:p>
@@ -21939,7 +21939,7 @@
               <a:rPr lang="es-ES" dirty="0" err="1" smtClean="0">
                 <a:latin typeface="Bahnschrift SemiBold Condensed" panose="020B0502040204020203" pitchFamily="34" charset="0"/>
               </a:rPr>
-              <a:t>Button</a:t>
+              <a:t>TextView</a:t>
             </a:r>
             <a:endParaRPr lang="es-CO" dirty="0">
               <a:latin typeface="Bahnschrift SemiBold Condensed" panose="020B0502040204020203" pitchFamily="34" charset="0"/>

</xml_diff>